<commit_message>
Apple App Store deployment
</commit_message>
<xml_diff>
--- a/media/icon-template.pptx
+++ b/media/icon-template.pptx
@@ -106,7 +106,7 @@
   </p:defaultTextStyle>
   <p:extLst>
     <p:ext uri="{EFAFB233-063F-42B5-8137-9DF3F51BA10A}">
-      <p15:sldGuideLst xmlns:p15="http://schemas.microsoft.com/office/powerpoint/2012/main"/>
+      <p15:sldGuideLst xmlns:p15="http://schemas.microsoft.com/office/powerpoint/2012/main" xmlns=""/>
     </p:ext>
   </p:extLst>
 </p:presentation>
@@ -243,7 +243,7 @@
           <a:p>
             <a:fld id="{3C8D21C9-6065-4506-8F9A-70A9BB6917CD}" type="datetimeFigureOut">
               <a:rPr lang="de-DE" smtClean="0"/>
-              <a:t>04.02.2017</a:t>
+              <a:t>09.02.2017</a:t>
             </a:fld>
             <a:endParaRPr lang="de-DE"/>
           </a:p>
@@ -285,7 +285,7 @@
           <a:p>
             <a:fld id="{71D19CC4-DE5F-4A9F-AD84-A568E8512C5E}" type="slidenum">
               <a:rPr lang="de-DE" smtClean="0"/>
-              <a:t>‹Nr.›</a:t>
+              <a:t>‹#›</a:t>
             </a:fld>
             <a:endParaRPr lang="de-DE"/>
           </a:p>
@@ -413,7 +413,7 @@
           <a:p>
             <a:fld id="{3C8D21C9-6065-4506-8F9A-70A9BB6917CD}" type="datetimeFigureOut">
               <a:rPr lang="de-DE" smtClean="0"/>
-              <a:t>04.02.2017</a:t>
+              <a:t>09.02.2017</a:t>
             </a:fld>
             <a:endParaRPr lang="de-DE"/>
           </a:p>
@@ -455,7 +455,7 @@
           <a:p>
             <a:fld id="{71D19CC4-DE5F-4A9F-AD84-A568E8512C5E}" type="slidenum">
               <a:rPr lang="de-DE" smtClean="0"/>
-              <a:t>‹Nr.›</a:t>
+              <a:t>‹#›</a:t>
             </a:fld>
             <a:endParaRPr lang="de-DE"/>
           </a:p>
@@ -593,7 +593,7 @@
           <a:p>
             <a:fld id="{3C8D21C9-6065-4506-8F9A-70A9BB6917CD}" type="datetimeFigureOut">
               <a:rPr lang="de-DE" smtClean="0"/>
-              <a:t>04.02.2017</a:t>
+              <a:t>09.02.2017</a:t>
             </a:fld>
             <a:endParaRPr lang="de-DE"/>
           </a:p>
@@ -635,7 +635,7 @@
           <a:p>
             <a:fld id="{71D19CC4-DE5F-4A9F-AD84-A568E8512C5E}" type="slidenum">
               <a:rPr lang="de-DE" smtClean="0"/>
-              <a:t>‹Nr.›</a:t>
+              <a:t>‹#›</a:t>
             </a:fld>
             <a:endParaRPr lang="de-DE"/>
           </a:p>
@@ -763,7 +763,7 @@
           <a:p>
             <a:fld id="{3C8D21C9-6065-4506-8F9A-70A9BB6917CD}" type="datetimeFigureOut">
               <a:rPr lang="de-DE" smtClean="0"/>
-              <a:t>04.02.2017</a:t>
+              <a:t>09.02.2017</a:t>
             </a:fld>
             <a:endParaRPr lang="de-DE"/>
           </a:p>
@@ -805,7 +805,7 @@
           <a:p>
             <a:fld id="{71D19CC4-DE5F-4A9F-AD84-A568E8512C5E}" type="slidenum">
               <a:rPr lang="de-DE" smtClean="0"/>
-              <a:t>‹Nr.›</a:t>
+              <a:t>‹#›</a:t>
             </a:fld>
             <a:endParaRPr lang="de-DE"/>
           </a:p>
@@ -1007,7 +1007,7 @@
           <a:p>
             <a:fld id="{3C8D21C9-6065-4506-8F9A-70A9BB6917CD}" type="datetimeFigureOut">
               <a:rPr lang="de-DE" smtClean="0"/>
-              <a:t>04.02.2017</a:t>
+              <a:t>09.02.2017</a:t>
             </a:fld>
             <a:endParaRPr lang="de-DE"/>
           </a:p>
@@ -1049,7 +1049,7 @@
           <a:p>
             <a:fld id="{71D19CC4-DE5F-4A9F-AD84-A568E8512C5E}" type="slidenum">
               <a:rPr lang="de-DE" smtClean="0"/>
-              <a:t>‹Nr.›</a:t>
+              <a:t>‹#›</a:t>
             </a:fld>
             <a:endParaRPr lang="de-DE"/>
           </a:p>
@@ -1239,7 +1239,7 @@
           <a:p>
             <a:fld id="{3C8D21C9-6065-4506-8F9A-70A9BB6917CD}" type="datetimeFigureOut">
               <a:rPr lang="de-DE" smtClean="0"/>
-              <a:t>04.02.2017</a:t>
+              <a:t>09.02.2017</a:t>
             </a:fld>
             <a:endParaRPr lang="de-DE"/>
           </a:p>
@@ -1281,7 +1281,7 @@
           <a:p>
             <a:fld id="{71D19CC4-DE5F-4A9F-AD84-A568E8512C5E}" type="slidenum">
               <a:rPr lang="de-DE" smtClean="0"/>
-              <a:t>‹Nr.›</a:t>
+              <a:t>‹#›</a:t>
             </a:fld>
             <a:endParaRPr lang="de-DE"/>
           </a:p>
@@ -1606,7 +1606,7 @@
           <a:p>
             <a:fld id="{3C8D21C9-6065-4506-8F9A-70A9BB6917CD}" type="datetimeFigureOut">
               <a:rPr lang="de-DE" smtClean="0"/>
-              <a:t>04.02.2017</a:t>
+              <a:t>09.02.2017</a:t>
             </a:fld>
             <a:endParaRPr lang="de-DE"/>
           </a:p>
@@ -1648,7 +1648,7 @@
           <a:p>
             <a:fld id="{71D19CC4-DE5F-4A9F-AD84-A568E8512C5E}" type="slidenum">
               <a:rPr lang="de-DE" smtClean="0"/>
-              <a:t>‹Nr.›</a:t>
+              <a:t>‹#›</a:t>
             </a:fld>
             <a:endParaRPr lang="de-DE"/>
           </a:p>
@@ -1724,7 +1724,7 @@
           <a:p>
             <a:fld id="{3C8D21C9-6065-4506-8F9A-70A9BB6917CD}" type="datetimeFigureOut">
               <a:rPr lang="de-DE" smtClean="0"/>
-              <a:t>04.02.2017</a:t>
+              <a:t>09.02.2017</a:t>
             </a:fld>
             <a:endParaRPr lang="de-DE"/>
           </a:p>
@@ -1766,7 +1766,7 @@
           <a:p>
             <a:fld id="{71D19CC4-DE5F-4A9F-AD84-A568E8512C5E}" type="slidenum">
               <a:rPr lang="de-DE" smtClean="0"/>
-              <a:t>‹Nr.›</a:t>
+              <a:t>‹#›</a:t>
             </a:fld>
             <a:endParaRPr lang="de-DE"/>
           </a:p>
@@ -1819,7 +1819,7 @@
           <a:p>
             <a:fld id="{3C8D21C9-6065-4506-8F9A-70A9BB6917CD}" type="datetimeFigureOut">
               <a:rPr lang="de-DE" smtClean="0"/>
-              <a:t>04.02.2017</a:t>
+              <a:t>09.02.2017</a:t>
             </a:fld>
             <a:endParaRPr lang="de-DE"/>
           </a:p>
@@ -1861,7 +1861,7 @@
           <a:p>
             <a:fld id="{71D19CC4-DE5F-4A9F-AD84-A568E8512C5E}" type="slidenum">
               <a:rPr lang="de-DE" smtClean="0"/>
-              <a:t>‹Nr.›</a:t>
+              <a:t>‹#›</a:t>
             </a:fld>
             <a:endParaRPr lang="de-DE"/>
           </a:p>
@@ -2096,7 +2096,7 @@
           <a:p>
             <a:fld id="{3C8D21C9-6065-4506-8F9A-70A9BB6917CD}" type="datetimeFigureOut">
               <a:rPr lang="de-DE" smtClean="0"/>
-              <a:t>04.02.2017</a:t>
+              <a:t>09.02.2017</a:t>
             </a:fld>
             <a:endParaRPr lang="de-DE"/>
           </a:p>
@@ -2138,7 +2138,7 @@
           <a:p>
             <a:fld id="{71D19CC4-DE5F-4A9F-AD84-A568E8512C5E}" type="slidenum">
               <a:rPr lang="de-DE" smtClean="0"/>
-              <a:t>‹Nr.›</a:t>
+              <a:t>‹#›</a:t>
             </a:fld>
             <a:endParaRPr lang="de-DE"/>
           </a:p>
@@ -2353,7 +2353,7 @@
           <a:p>
             <a:fld id="{3C8D21C9-6065-4506-8F9A-70A9BB6917CD}" type="datetimeFigureOut">
               <a:rPr lang="de-DE" smtClean="0"/>
-              <a:t>04.02.2017</a:t>
+              <a:t>09.02.2017</a:t>
             </a:fld>
             <a:endParaRPr lang="de-DE"/>
           </a:p>
@@ -2395,7 +2395,7 @@
           <a:p>
             <a:fld id="{71D19CC4-DE5F-4A9F-AD84-A568E8512C5E}" type="slidenum">
               <a:rPr lang="de-DE" smtClean="0"/>
-              <a:t>‹Nr.›</a:t>
+              <a:t>‹#›</a:t>
             </a:fld>
             <a:endParaRPr lang="de-DE"/>
           </a:p>
@@ -2566,7 +2566,7 @@
           <a:p>
             <a:fld id="{3C8D21C9-6065-4506-8F9A-70A9BB6917CD}" type="datetimeFigureOut">
               <a:rPr lang="de-DE" smtClean="0"/>
-              <a:t>04.02.2017</a:t>
+              <a:t>09.02.2017</a:t>
             </a:fld>
             <a:endParaRPr lang="de-DE"/>
           </a:p>
@@ -2644,7 +2644,7 @@
           <a:p>
             <a:fld id="{71D19CC4-DE5F-4A9F-AD84-A568E8512C5E}" type="slidenum">
               <a:rPr lang="de-DE" smtClean="0"/>
-              <a:t>‹Nr.›</a:t>
+              <a:t>‹#›</a:t>
             </a:fld>
             <a:endParaRPr lang="de-DE"/>
           </a:p>
@@ -4027,7 +4027,7 @@
   <a:extraClrSchemeLst/>
   <a:extLst>
     <a:ext uri="{05A4C25C-085E-4340-85A3-A5531E510DB2}">
-      <thm15:themeFamily xmlns:thm15="http://schemas.microsoft.com/office/thememl/2012/main" name="Office Theme" id="{62F939B6-93AF-4DB8-9C6B-D6C7DFDC589F}" vid="{4A3C46E8-61CC-4603-A589-7422A47A8E4A}"/>
+      <thm15:themeFamily xmlns:thm15="http://schemas.microsoft.com/office/thememl/2012/main" xmlns="" name="Office Theme" id="{62F939B6-93AF-4DB8-9C6B-D6C7DFDC589F}" vid="{4A3C46E8-61CC-4603-A589-7422A47A8E4A}"/>
     </a:ext>
   </a:extLst>
 </a:theme>

</xml_diff>